<commit_message>
Added HyunDo to Power Point
</commit_message>
<xml_diff>
--- a/Mario Bros.pptx
+++ b/Mario Bros.pptx
@@ -10,6 +10,7 @@
     <p:sldId id="258" r:id="rId4"/>
     <p:sldId id="259" r:id="rId5"/>
     <p:sldId id="260" r:id="rId6"/>
+    <p:sldId id="261" r:id="rId7"/>
   </p:sldIdLst>
   <p:sldSz cx="12192000" cy="6858000"/>
   <p:notesSz cx="6858000" cy="9144000"/>
@@ -447,7 +448,7 @@
           <a:p>
             <a:fld id="{6C98A745-26DB-4AC5-AC31-B729D51E2AAB}" type="datetimeFigureOut">
               <a:rPr lang="en-US" smtClean="0"/>
-              <a:t>11/14/18</a:t>
+              <a:t>11/28/18</a:t>
             </a:fld>
             <a:endParaRPr lang="en-US"/>
           </a:p>
@@ -771,7 +772,7 @@
           <a:p>
             <a:fld id="{6C98A745-26DB-4AC5-AC31-B729D51E2AAB}" type="datetimeFigureOut">
               <a:rPr lang="en-US" smtClean="0"/>
-              <a:t>11/14/18</a:t>
+              <a:t>11/28/18</a:t>
             </a:fld>
             <a:endParaRPr lang="en-US"/>
           </a:p>
@@ -1019,7 +1020,7 @@
           <a:p>
             <a:fld id="{6C98A745-26DB-4AC5-AC31-B729D51E2AAB}" type="datetimeFigureOut">
               <a:rPr lang="en-US" smtClean="0"/>
-              <a:t>11/14/18</a:t>
+              <a:t>11/28/18</a:t>
             </a:fld>
             <a:endParaRPr lang="en-US"/>
           </a:p>
@@ -1358,7 +1359,7 @@
           <a:p>
             <a:fld id="{6C98A745-26DB-4AC5-AC31-B729D51E2AAB}" type="datetimeFigureOut">
               <a:rPr lang="en-US" smtClean="0"/>
-              <a:t>11/14/18</a:t>
+              <a:t>11/28/18</a:t>
             </a:fld>
             <a:endParaRPr lang="en-US"/>
           </a:p>
@@ -1705,7 +1706,7 @@
           <a:p>
             <a:fld id="{6C98A745-26DB-4AC5-AC31-B729D51E2AAB}" type="datetimeFigureOut">
               <a:rPr lang="en-US" smtClean="0"/>
-              <a:t>11/14/18</a:t>
+              <a:t>11/28/18</a:t>
             </a:fld>
             <a:endParaRPr lang="en-US"/>
           </a:p>
@@ -2079,7 +2080,7 @@
           <a:p>
             <a:fld id="{6C98A745-26DB-4AC5-AC31-B729D51E2AAB}" type="datetimeFigureOut">
               <a:rPr lang="en-US" smtClean="0"/>
-              <a:t>11/14/18</a:t>
+              <a:t>11/28/18</a:t>
             </a:fld>
             <a:endParaRPr lang="en-US"/>
           </a:p>
@@ -2549,7 +2550,7 @@
           <a:p>
             <a:fld id="{6C98A745-26DB-4AC5-AC31-B729D51E2AAB}" type="datetimeFigureOut">
               <a:rPr lang="en-US" smtClean="0"/>
-              <a:t>11/14/18</a:t>
+              <a:t>11/28/18</a:t>
             </a:fld>
             <a:endParaRPr lang="en-US"/>
           </a:p>
@@ -2754,7 +2755,7 @@
           <a:p>
             <a:fld id="{6C98A745-26DB-4AC5-AC31-B729D51E2AAB}" type="datetimeFigureOut">
               <a:rPr lang="en-US" smtClean="0"/>
-              <a:t>11/14/18</a:t>
+              <a:t>11/28/18</a:t>
             </a:fld>
             <a:endParaRPr lang="en-US"/>
           </a:p>
@@ -2965,7 +2966,7 @@
           <a:p>
             <a:fld id="{6C98A745-26DB-4AC5-AC31-B729D51E2AAB}" type="datetimeFigureOut">
               <a:rPr lang="en-US" smtClean="0"/>
-              <a:t>11/14/18</a:t>
+              <a:t>11/28/18</a:t>
             </a:fld>
             <a:endParaRPr lang="en-US"/>
           </a:p>
@@ -3197,7 +3198,7 @@
           <a:p>
             <a:fld id="{6C98A745-26DB-4AC5-AC31-B729D51E2AAB}" type="datetimeFigureOut">
               <a:rPr lang="en-US" smtClean="0"/>
-              <a:t>11/14/18</a:t>
+              <a:t>11/28/18</a:t>
             </a:fld>
             <a:endParaRPr lang="en-US"/>
           </a:p>
@@ -3445,7 +3446,7 @@
           <a:p>
             <a:fld id="{6C98A745-26DB-4AC5-AC31-B729D51E2AAB}" type="datetimeFigureOut">
               <a:rPr lang="en-US" smtClean="0"/>
-              <a:t>11/14/18</a:t>
+              <a:t>11/28/18</a:t>
             </a:fld>
             <a:endParaRPr lang="en-US"/>
           </a:p>
@@ -3712,7 +3713,7 @@
           <a:p>
             <a:fld id="{6C98A745-26DB-4AC5-AC31-B729D51E2AAB}" type="datetimeFigureOut">
               <a:rPr lang="en-US" smtClean="0"/>
-              <a:t>11/14/18</a:t>
+              <a:t>11/28/18</a:t>
             </a:fld>
             <a:endParaRPr lang="en-US"/>
           </a:p>
@@ -4125,7 +4126,7 @@
           <a:p>
             <a:fld id="{6C98A745-26DB-4AC5-AC31-B729D51E2AAB}" type="datetimeFigureOut">
               <a:rPr lang="en-US" smtClean="0"/>
-              <a:t>11/14/18</a:t>
+              <a:t>11/28/18</a:t>
             </a:fld>
             <a:endParaRPr lang="en-US"/>
           </a:p>
@@ -4274,7 +4275,7 @@
           <a:p>
             <a:fld id="{6C98A745-26DB-4AC5-AC31-B729D51E2AAB}" type="datetimeFigureOut">
               <a:rPr lang="en-US" smtClean="0"/>
-              <a:t>11/14/18</a:t>
+              <a:t>11/28/18</a:t>
             </a:fld>
             <a:endParaRPr lang="en-US"/>
           </a:p>
@@ -4400,7 +4401,7 @@
           <a:p>
             <a:fld id="{6C98A745-26DB-4AC5-AC31-B729D51E2AAB}" type="datetimeFigureOut">
               <a:rPr lang="en-US" smtClean="0"/>
-              <a:t>11/14/18</a:t>
+              <a:t>11/28/18</a:t>
             </a:fld>
             <a:endParaRPr lang="en-US"/>
           </a:p>
@@ -4655,7 +4656,7 @@
           <a:p>
             <a:fld id="{6C98A745-26DB-4AC5-AC31-B729D51E2AAB}" type="datetimeFigureOut">
               <a:rPr lang="en-US" smtClean="0"/>
-              <a:t>11/14/18</a:t>
+              <a:t>11/28/18</a:t>
             </a:fld>
             <a:endParaRPr lang="en-US"/>
           </a:p>
@@ -4970,7 +4971,7 @@
           <a:p>
             <a:fld id="{6C98A745-26DB-4AC5-AC31-B729D51E2AAB}" type="datetimeFigureOut">
               <a:rPr lang="en-US" smtClean="0"/>
-              <a:t>11/14/18</a:t>
+              <a:t>11/28/18</a:t>
             </a:fld>
             <a:endParaRPr lang="en-US"/>
           </a:p>
@@ -5321,7 +5322,7 @@
           <a:p>
             <a:fld id="{6C98A745-26DB-4AC5-AC31-B729D51E2AAB}" type="datetimeFigureOut">
               <a:rPr lang="en-US" smtClean="0"/>
-              <a:t>11/14/18</a:t>
+              <a:t>11/28/18</a:t>
             </a:fld>
             <a:endParaRPr lang="en-US"/>
           </a:p>
@@ -6078,7 +6079,7 @@
           <a:p>
             <a:r>
               <a:rPr lang="en-US" dirty="0"/>
-              <a:t>Role: Liaison, Working on platforms and pipes</a:t>
+              <a:t>Role: Working on Sprite Class, Collision boxes</a:t>
             </a:r>
           </a:p>
         </p:txBody>
@@ -6176,19 +6177,14 @@
           <a:p>
             <a:r>
               <a:rPr lang="en-US" dirty="0"/>
-              <a:t>Interesting Fact: nothing Kill me</a:t>
+              <a:t>Interesting Fact: Likes Dragon Ball Z</a:t>
             </a:r>
           </a:p>
           <a:p>
             <a:r>
               <a:rPr lang="en-US" dirty="0"/>
-              <a:t>Role: Enemy movement and design of fighter flies and </a:t>
-            </a:r>
-            <a:r>
-              <a:rPr lang="en-US" dirty="0" err="1"/>
-              <a:t>splitice</a:t>
-            </a:r>
-            <a:endParaRPr lang="en-US" dirty="0"/>
+              <a:t>Role: Enemy movement and design of fighter flies and slip ice</a:t>
+            </a:r>
           </a:p>
           <a:p>
             <a:endParaRPr lang="en-US" dirty="0"/>
@@ -6288,13 +6284,21 @@
           <a:p>
             <a:r>
               <a:rPr lang="en-US" dirty="0"/>
-              <a:t>Role: Enemy movement and design</a:t>
+              <a:t>Interesting fact: has a black belt</a:t>
             </a:r>
           </a:p>
           <a:p>
             <a:r>
               <a:rPr lang="en-US" dirty="0"/>
-              <a:t>Interesting fact: has a black belt</a:t>
+              <a:t>Role: </a:t>
+            </a:r>
+            <a:r>
+              <a:rPr lang="en-US" dirty="0" err="1"/>
+              <a:t>Shellcreeper</a:t>
+            </a:r>
+            <a:r>
+              <a:rPr lang="en-US" dirty="0"/>
+              <a:t> and Sidestepper movement and design</a:t>
             </a:r>
           </a:p>
         </p:txBody>
@@ -6414,6 +6418,114 @@
     <p:extLst>
       <p:ext uri="{BB962C8B-B14F-4D97-AF65-F5344CB8AC3E}">
         <p14:creationId xmlns:p14="http://schemas.microsoft.com/office/powerpoint/2010/main" val="2655915451"/>
+      </p:ext>
+    </p:extLst>
+  </p:cSld>
+  <p:clrMapOvr>
+    <a:masterClrMapping/>
+  </p:clrMapOvr>
+</p:sld>
+</file>
+
+<file path=ppt/slides/slide6.xml><?xml version="1.0" encoding="utf-8"?>
+<p:sld xmlns:a="http://schemas.openxmlformats.org/drawingml/2006/main" xmlns:r="http://schemas.openxmlformats.org/officeDocument/2006/relationships" xmlns:p="http://schemas.openxmlformats.org/presentationml/2006/main">
+  <p:cSld>
+    <p:spTree>
+      <p:nvGrpSpPr>
+        <p:cNvPr id="1" name=""/>
+        <p:cNvGrpSpPr/>
+        <p:nvPr/>
+      </p:nvGrpSpPr>
+      <p:grpSpPr>
+        <a:xfrm>
+          <a:off x="0" y="0"/>
+          <a:ext cx="0" cy="0"/>
+          <a:chOff x="0" y="0"/>
+          <a:chExt cx="0" cy="0"/>
+        </a:xfrm>
+      </p:grpSpPr>
+      <p:sp>
+        <p:nvSpPr>
+          <p:cNvPr id="2" name="Title 1">
+            <a:extLst>
+              <a:ext uri="{FF2B5EF4-FFF2-40B4-BE49-F238E27FC236}">
+                <a16:creationId xmlns:a16="http://schemas.microsoft.com/office/drawing/2014/main" id="{1CC1429B-F771-3847-AC30-BB8535E31A9F}"/>
+              </a:ext>
+            </a:extLst>
+          </p:cNvPr>
+          <p:cNvSpPr>
+            <a:spLocks noGrp="1"/>
+          </p:cNvSpPr>
+          <p:nvPr>
+            <p:ph type="title"/>
+          </p:nvPr>
+        </p:nvSpPr>
+        <p:spPr/>
+        <p:txBody>
+          <a:bodyPr/>
+          <a:lstStyle/>
+          <a:p>
+            <a:r>
+              <a:rPr lang="en-US" dirty="0" err="1"/>
+              <a:t>HyunDo</a:t>
+            </a:r>
+            <a:r>
+              <a:rPr lang="en-US" dirty="0"/>
+              <a:t> Song</a:t>
+            </a:r>
+          </a:p>
+        </p:txBody>
+      </p:sp>
+      <p:sp>
+        <p:nvSpPr>
+          <p:cNvPr id="3" name="Content Placeholder 2">
+            <a:extLst>
+              <a:ext uri="{FF2B5EF4-FFF2-40B4-BE49-F238E27FC236}">
+                <a16:creationId xmlns:a16="http://schemas.microsoft.com/office/drawing/2014/main" id="{BA37D12F-9D75-874C-AD13-4FF5F9C31B99}"/>
+              </a:ext>
+            </a:extLst>
+          </p:cNvPr>
+          <p:cNvSpPr>
+            <a:spLocks noGrp="1"/>
+          </p:cNvSpPr>
+          <p:nvPr>
+            <p:ph idx="1"/>
+          </p:nvPr>
+        </p:nvSpPr>
+        <p:spPr/>
+        <p:txBody>
+          <a:bodyPr/>
+          <a:lstStyle/>
+          <a:p>
+            <a:r>
+              <a:rPr lang="en-US" dirty="0"/>
+              <a:t>Hometown: Seoul, South Korea</a:t>
+            </a:r>
+          </a:p>
+          <a:p>
+            <a:r>
+              <a:rPr lang="en-US" dirty="0"/>
+              <a:t>Major: Computer Science/Game Design</a:t>
+            </a:r>
+          </a:p>
+          <a:p>
+            <a:r>
+              <a:rPr lang="en-US" dirty="0"/>
+              <a:t>Interesting Fact: Has lived in South Korea, California, and Alaska</a:t>
+            </a:r>
+          </a:p>
+          <a:p>
+            <a:r>
+              <a:rPr lang="en-US" dirty="0"/>
+              <a:t>Role: Collab on Sprite Class and Platform/Level design</a:t>
+            </a:r>
+          </a:p>
+        </p:txBody>
+      </p:sp>
+    </p:spTree>
+    <p:extLst>
+      <p:ext uri="{BB962C8B-B14F-4D97-AF65-F5344CB8AC3E}">
+        <p14:creationId xmlns:p14="http://schemas.microsoft.com/office/powerpoint/2010/main" val="1048270773"/>
       </p:ext>
     </p:extLst>
   </p:cSld>

</xml_diff>

<commit_message>
Added Yutong to Power Point
</commit_message>
<xml_diff>
--- a/Mario Bros.pptx
+++ b/Mario Bros.pptx
@@ -11,6 +11,7 @@
     <p:sldId id="259" r:id="rId5"/>
     <p:sldId id="260" r:id="rId6"/>
     <p:sldId id="261" r:id="rId7"/>
+    <p:sldId id="262" r:id="rId8"/>
   </p:sldIdLst>
   <p:sldSz cx="12192000" cy="6858000"/>
   <p:notesSz cx="6858000" cy="9144000"/>
@@ -6535,6 +6536,108 @@
 </p:sld>
 </file>
 
+<file path=ppt/slides/slide7.xml><?xml version="1.0" encoding="utf-8"?>
+<p:sld xmlns:a="http://schemas.openxmlformats.org/drawingml/2006/main" xmlns:r="http://schemas.openxmlformats.org/officeDocument/2006/relationships" xmlns:p="http://schemas.openxmlformats.org/presentationml/2006/main">
+  <p:cSld>
+    <p:spTree>
+      <p:nvGrpSpPr>
+        <p:cNvPr id="1" name=""/>
+        <p:cNvGrpSpPr/>
+        <p:nvPr/>
+      </p:nvGrpSpPr>
+      <p:grpSpPr>
+        <a:xfrm>
+          <a:off x="0" y="0"/>
+          <a:ext cx="0" cy="0"/>
+          <a:chOff x="0" y="0"/>
+          <a:chExt cx="0" cy="0"/>
+        </a:xfrm>
+      </p:grpSpPr>
+      <p:sp>
+        <p:nvSpPr>
+          <p:cNvPr id="2" name="Title 1">
+            <a:extLst>
+              <a:ext uri="{FF2B5EF4-FFF2-40B4-BE49-F238E27FC236}">
+                <a16:creationId xmlns:a16="http://schemas.microsoft.com/office/drawing/2014/main" id="{04CED0B5-5499-6D48-87FD-F3C936D604F3}"/>
+              </a:ext>
+            </a:extLst>
+          </p:cNvPr>
+          <p:cNvSpPr>
+            <a:spLocks noGrp="1"/>
+          </p:cNvSpPr>
+          <p:nvPr>
+            <p:ph type="title"/>
+          </p:nvPr>
+        </p:nvSpPr>
+        <p:spPr/>
+        <p:txBody>
+          <a:bodyPr/>
+          <a:lstStyle/>
+          <a:p>
+            <a:r>
+              <a:rPr lang="en-US" dirty="0"/>
+              <a:t>Yutong Zhang</a:t>
+            </a:r>
+          </a:p>
+        </p:txBody>
+      </p:sp>
+      <p:sp>
+        <p:nvSpPr>
+          <p:cNvPr id="3" name="Content Placeholder 2">
+            <a:extLst>
+              <a:ext uri="{FF2B5EF4-FFF2-40B4-BE49-F238E27FC236}">
+                <a16:creationId xmlns:a16="http://schemas.microsoft.com/office/drawing/2014/main" id="{15A3AF52-34EE-484A-ACB8-168A92D9E2A6}"/>
+              </a:ext>
+            </a:extLst>
+          </p:cNvPr>
+          <p:cNvSpPr>
+            <a:spLocks noGrp="1"/>
+          </p:cNvSpPr>
+          <p:nvPr>
+            <p:ph idx="1"/>
+          </p:nvPr>
+        </p:nvSpPr>
+        <p:spPr/>
+        <p:txBody>
+          <a:bodyPr/>
+          <a:lstStyle/>
+          <a:p>
+            <a:r>
+              <a:rPr lang="en-US" dirty="0"/>
+              <a:t>Hometown: Beijing</a:t>
+            </a:r>
+            <a:r>
+              <a:rPr lang="en-US"/>
+              <a:t>, China</a:t>
+            </a:r>
+          </a:p>
+          <a:p>
+            <a:r>
+              <a:rPr lang="en-US" dirty="0"/>
+              <a:t>Major: Computer Science</a:t>
+            </a:r>
+          </a:p>
+          <a:p>
+            <a:r>
+              <a:rPr lang="en-US" dirty="0"/>
+              <a:t>Role: Sound class design and implementation</a:t>
+            </a:r>
+          </a:p>
+        </p:txBody>
+      </p:sp>
+    </p:spTree>
+    <p:extLst>
+      <p:ext uri="{BB962C8B-B14F-4D97-AF65-F5344CB8AC3E}">
+        <p14:creationId xmlns:p14="http://schemas.microsoft.com/office/powerpoint/2010/main" val="2803822131"/>
+      </p:ext>
+    </p:extLst>
+  </p:cSld>
+  <p:clrMapOvr>
+    <a:masterClrMapping/>
+  </p:clrMapOvr>
+</p:sld>
+</file>
+
 <file path=ppt/theme/theme1.xml><?xml version="1.0" encoding="utf-8"?>
 <a:theme xmlns:a="http://schemas.openxmlformats.org/drawingml/2006/main" name="Organic">
   <a:themeElements>

</xml_diff>

<commit_message>
Got Mario to finally move around and jump correctly Also fixed Walls and Collision boxes so they can detect collisions
</commit_message>
<xml_diff>
--- a/Mario Bros.pptx
+++ b/Mario Bros.pptx
@@ -7,11 +7,12 @@
   <p:sldIdLst>
     <p:sldId id="256" r:id="rId2"/>
     <p:sldId id="257" r:id="rId3"/>
-    <p:sldId id="258" r:id="rId4"/>
-    <p:sldId id="259" r:id="rId5"/>
-    <p:sldId id="260" r:id="rId6"/>
-    <p:sldId id="261" r:id="rId7"/>
-    <p:sldId id="262" r:id="rId8"/>
+    <p:sldId id="263" r:id="rId4"/>
+    <p:sldId id="258" r:id="rId5"/>
+    <p:sldId id="259" r:id="rId6"/>
+    <p:sldId id="260" r:id="rId7"/>
+    <p:sldId id="261" r:id="rId8"/>
+    <p:sldId id="262" r:id="rId9"/>
   </p:sldIdLst>
   <p:sldSz cx="12192000" cy="6858000"/>
   <p:notesSz cx="6858000" cy="9144000"/>
@@ -6120,7 +6121,7 @@
           <p:cNvPr id="2" name="Title 1">
             <a:extLst>
               <a:ext uri="{FF2B5EF4-FFF2-40B4-BE49-F238E27FC236}">
-                <a16:creationId xmlns:a16="http://schemas.microsoft.com/office/drawing/2014/main" id="{C47C6ACB-8FB4-4A93-85AD-DBCFEA04EAA3}"/>
+                <a16:creationId xmlns:a16="http://schemas.microsoft.com/office/drawing/2014/main" id="{590234C9-67F9-AB43-886F-664140F2EE1C}"/>
               </a:ext>
             </a:extLst>
           </p:cNvPr>
@@ -6138,64 +6139,51 @@
           <a:p>
             <a:r>
               <a:rPr lang="en-US" dirty="0"/>
-              <a:t>Chandler Autrey</a:t>
-            </a:r>
-          </a:p>
-        </p:txBody>
-      </p:sp>
-      <p:sp>
-        <p:nvSpPr>
-          <p:cNvPr id="3" name="Content Placeholder 2">
+              <a:t>Basic Sprite Structure</a:t>
+            </a:r>
+          </a:p>
+        </p:txBody>
+      </p:sp>
+      <p:pic>
+        <p:nvPicPr>
+          <p:cNvPr id="7" name="Picture 6">
             <a:extLst>
               <a:ext uri="{FF2B5EF4-FFF2-40B4-BE49-F238E27FC236}">
-                <a16:creationId xmlns:a16="http://schemas.microsoft.com/office/drawing/2014/main" id="{C060C7D4-4F6B-4664-B9F6-2193A23FD77B}"/>
+                <a16:creationId xmlns:a16="http://schemas.microsoft.com/office/drawing/2014/main" id="{1D458CA3-A977-B143-AE43-B8D2D9D46EA9}"/>
               </a:ext>
             </a:extLst>
           </p:cNvPr>
-          <p:cNvSpPr>
-            <a:spLocks noGrp="1"/>
-          </p:cNvSpPr>
-          <p:nvPr>
-            <p:ph idx="1"/>
-          </p:nvPr>
-        </p:nvSpPr>
-        <p:spPr/>
-        <p:txBody>
-          <a:bodyPr/>
-          <a:lstStyle/>
-          <a:p>
-            <a:r>
-              <a:rPr lang="en-US" dirty="0"/>
-              <a:t>Hometown : Houston, Tx</a:t>
-            </a:r>
-          </a:p>
-          <a:p>
-            <a:r>
-              <a:rPr lang="en-US" dirty="0"/>
-              <a:t>Major: Computer Science</a:t>
-            </a:r>
-          </a:p>
-          <a:p>
-            <a:r>
-              <a:rPr lang="en-US" dirty="0"/>
-              <a:t>Interesting Fact: Likes Dragon Ball Z</a:t>
-            </a:r>
-          </a:p>
-          <a:p>
-            <a:r>
-              <a:rPr lang="en-US" dirty="0"/>
-              <a:t>Role: Enemy movement and design of fighter flies and slip ice</a:t>
-            </a:r>
-          </a:p>
-          <a:p>
-            <a:endParaRPr lang="en-US" dirty="0"/>
-          </a:p>
-        </p:txBody>
-      </p:sp>
+          <p:cNvPicPr>
+            <a:picLocks noChangeAspect="1"/>
+          </p:cNvPicPr>
+          <p:nvPr/>
+        </p:nvPicPr>
+        <p:blipFill>
+          <a:blip r:embed="rId2">
+            <a:extLst>
+              <a:ext uri="{28A0092B-C50C-407E-A947-70E740481C1C}">
+                <a14:useLocalDpi xmlns:a14="http://schemas.microsoft.com/office/drawing/2010/main" val="0"/>
+              </a:ext>
+            </a:extLst>
+          </a:blip>
+          <a:stretch>
+            <a:fillRect/>
+          </a:stretch>
+        </p:blipFill>
+        <p:spPr>
+          <a:xfrm>
+            <a:off x="3671207" y="2477240"/>
+            <a:ext cx="4849586" cy="3790210"/>
+          </a:xfrm>
+          <a:prstGeom prst="rect">
+            <a:avLst/>
+          </a:prstGeom>
+        </p:spPr>
+      </p:pic>
     </p:spTree>
     <p:extLst>
       <p:ext uri="{BB962C8B-B14F-4D97-AF65-F5344CB8AC3E}">
-        <p14:creationId xmlns:p14="http://schemas.microsoft.com/office/powerpoint/2010/main" val="3049751439"/>
+        <p14:creationId xmlns:p14="http://schemas.microsoft.com/office/powerpoint/2010/main" val="2977041870"/>
       </p:ext>
     </p:extLst>
   </p:cSld>
@@ -6227,7 +6215,7 @@
           <p:cNvPr id="2" name="Title 1">
             <a:extLst>
               <a:ext uri="{FF2B5EF4-FFF2-40B4-BE49-F238E27FC236}">
-                <a16:creationId xmlns:a16="http://schemas.microsoft.com/office/drawing/2014/main" id="{D5F2E82A-C92C-4CB9-B545-9D3A3C900219}"/>
+                <a16:creationId xmlns:a16="http://schemas.microsoft.com/office/drawing/2014/main" id="{C47C6ACB-8FB4-4A93-85AD-DBCFEA04EAA3}"/>
               </a:ext>
             </a:extLst>
           </p:cNvPr>
@@ -6245,7 +6233,7 @@
           <a:p>
             <a:r>
               <a:rPr lang="en-US" dirty="0"/>
-              <a:t>Evan Berryman</a:t>
+              <a:t>Chandler Autrey</a:t>
             </a:r>
           </a:p>
         </p:txBody>
@@ -6255,7 +6243,7 @@
           <p:cNvPr id="3" name="Content Placeholder 2">
             <a:extLst>
               <a:ext uri="{FF2B5EF4-FFF2-40B4-BE49-F238E27FC236}">
-                <a16:creationId xmlns:a16="http://schemas.microsoft.com/office/drawing/2014/main" id="{52900013-AF91-4F29-BAF3-E953BCC7C61D}"/>
+                <a16:creationId xmlns:a16="http://schemas.microsoft.com/office/drawing/2014/main" id="{C060C7D4-4F6B-4664-B9F6-2193A23FD77B}"/>
               </a:ext>
             </a:extLst>
           </p:cNvPr>
@@ -6273,41 +6261,36 @@
           <a:p>
             <a:r>
               <a:rPr lang="en-US" dirty="0"/>
-              <a:t>Hometown: Spring, TX</a:t>
+              <a:t>Hometown : Houston, Tx</a:t>
             </a:r>
           </a:p>
           <a:p>
             <a:r>
               <a:rPr lang="en-US" dirty="0"/>
-              <a:t>Major: Computer Science (Game Design)</a:t>
+              <a:t>Major: Computer Science</a:t>
             </a:r>
           </a:p>
           <a:p>
             <a:r>
               <a:rPr lang="en-US" dirty="0"/>
-              <a:t>Interesting fact: has a black belt</a:t>
+              <a:t>Interesting Fact: Likes Dragon Ball Z</a:t>
             </a:r>
           </a:p>
           <a:p>
             <a:r>
               <a:rPr lang="en-US" dirty="0"/>
-              <a:t>Role: </a:t>
-            </a:r>
-            <a:r>
-              <a:rPr lang="en-US" dirty="0" err="1"/>
-              <a:t>Shellcreeper</a:t>
-            </a:r>
-            <a:r>
-              <a:rPr lang="en-US" dirty="0"/>
-              <a:t> and Sidestepper movement and design</a:t>
-            </a:r>
+              <a:t>Role: Enemy movement and design of fighter flies and slip ice</a:t>
+            </a:r>
+          </a:p>
+          <a:p>
+            <a:endParaRPr lang="en-US" dirty="0"/>
           </a:p>
         </p:txBody>
       </p:sp>
     </p:spTree>
     <p:extLst>
       <p:ext uri="{BB962C8B-B14F-4D97-AF65-F5344CB8AC3E}">
-        <p14:creationId xmlns:p14="http://schemas.microsoft.com/office/powerpoint/2010/main" val="5563138"/>
+        <p14:creationId xmlns:p14="http://schemas.microsoft.com/office/powerpoint/2010/main" val="3049751439"/>
       </p:ext>
     </p:extLst>
   </p:cSld>
@@ -6339,7 +6322,7 @@
           <p:cNvPr id="2" name="Title 1">
             <a:extLst>
               <a:ext uri="{FF2B5EF4-FFF2-40B4-BE49-F238E27FC236}">
-                <a16:creationId xmlns:a16="http://schemas.microsoft.com/office/drawing/2014/main" id="{7A5B9CBE-B412-48BB-B512-C36F946F595A}"/>
+                <a16:creationId xmlns:a16="http://schemas.microsoft.com/office/drawing/2014/main" id="{D5F2E82A-C92C-4CB9-B545-9D3A3C900219}"/>
               </a:ext>
             </a:extLst>
           </p:cNvPr>
@@ -6356,12 +6339,8 @@
           <a:lstStyle/>
           <a:p>
             <a:r>
-              <a:rPr lang="en-US" dirty="0" err="1"/>
-              <a:t>Jiabei</a:t>
-            </a:r>
-            <a:r>
               <a:rPr lang="en-US" dirty="0"/>
-              <a:t> He</a:t>
+              <a:t>Evan Berryman</a:t>
             </a:r>
           </a:p>
         </p:txBody>
@@ -6371,7 +6350,7 @@
           <p:cNvPr id="3" name="Content Placeholder 2">
             <a:extLst>
               <a:ext uri="{FF2B5EF4-FFF2-40B4-BE49-F238E27FC236}">
-                <a16:creationId xmlns:a16="http://schemas.microsoft.com/office/drawing/2014/main" id="{77C4FB41-C646-4D73-BFC3-65CCD38C1925}"/>
+                <a16:creationId xmlns:a16="http://schemas.microsoft.com/office/drawing/2014/main" id="{52900013-AF91-4F29-BAF3-E953BCC7C61D}"/>
               </a:ext>
             </a:extLst>
           </p:cNvPr>
@@ -6389,36 +6368,41 @@
           <a:p>
             <a:r>
               <a:rPr lang="en-US" dirty="0"/>
-              <a:t>Hometown: Xi’an, China</a:t>
+              <a:t>Hometown: Spring, TX</a:t>
             </a:r>
           </a:p>
           <a:p>
             <a:r>
               <a:rPr lang="en-US" dirty="0"/>
-              <a:t>Major: Computer Science</a:t>
+              <a:t>Major: Computer Science (Game Design)</a:t>
             </a:r>
           </a:p>
           <a:p>
             <a:r>
               <a:rPr lang="en-US" dirty="0"/>
-              <a:t>Interesting Fact: never give up</a:t>
+              <a:t>Interesting fact: has a black belt</a:t>
             </a:r>
           </a:p>
           <a:p>
             <a:r>
               <a:rPr lang="en-US" dirty="0"/>
-              <a:t>Role: Mario movement and design</a:t>
-            </a:r>
-          </a:p>
-          <a:p>
-            <a:endParaRPr lang="en-US" dirty="0"/>
+              <a:t>Role: </a:t>
+            </a:r>
+            <a:r>
+              <a:rPr lang="en-US" dirty="0" err="1"/>
+              <a:t>Shellcreeper</a:t>
+            </a:r>
+            <a:r>
+              <a:rPr lang="en-US" dirty="0"/>
+              <a:t> and Sidestepper movement and design</a:t>
+            </a:r>
           </a:p>
         </p:txBody>
       </p:sp>
     </p:spTree>
     <p:extLst>
       <p:ext uri="{BB962C8B-B14F-4D97-AF65-F5344CB8AC3E}">
-        <p14:creationId xmlns:p14="http://schemas.microsoft.com/office/powerpoint/2010/main" val="2655915451"/>
+        <p14:creationId xmlns:p14="http://schemas.microsoft.com/office/powerpoint/2010/main" val="5563138"/>
       </p:ext>
     </p:extLst>
   </p:cSld>
@@ -6450,6 +6434,117 @@
           <p:cNvPr id="2" name="Title 1">
             <a:extLst>
               <a:ext uri="{FF2B5EF4-FFF2-40B4-BE49-F238E27FC236}">
+                <a16:creationId xmlns:a16="http://schemas.microsoft.com/office/drawing/2014/main" id="{7A5B9CBE-B412-48BB-B512-C36F946F595A}"/>
+              </a:ext>
+            </a:extLst>
+          </p:cNvPr>
+          <p:cNvSpPr>
+            <a:spLocks noGrp="1"/>
+          </p:cNvSpPr>
+          <p:nvPr>
+            <p:ph type="title"/>
+          </p:nvPr>
+        </p:nvSpPr>
+        <p:spPr/>
+        <p:txBody>
+          <a:bodyPr/>
+          <a:lstStyle/>
+          <a:p>
+            <a:r>
+              <a:rPr lang="en-US" dirty="0" err="1"/>
+              <a:t>Jiabei</a:t>
+            </a:r>
+            <a:r>
+              <a:rPr lang="en-US" dirty="0"/>
+              <a:t> He</a:t>
+            </a:r>
+          </a:p>
+        </p:txBody>
+      </p:sp>
+      <p:sp>
+        <p:nvSpPr>
+          <p:cNvPr id="3" name="Content Placeholder 2">
+            <a:extLst>
+              <a:ext uri="{FF2B5EF4-FFF2-40B4-BE49-F238E27FC236}">
+                <a16:creationId xmlns:a16="http://schemas.microsoft.com/office/drawing/2014/main" id="{77C4FB41-C646-4D73-BFC3-65CCD38C1925}"/>
+              </a:ext>
+            </a:extLst>
+          </p:cNvPr>
+          <p:cNvSpPr>
+            <a:spLocks noGrp="1"/>
+          </p:cNvSpPr>
+          <p:nvPr>
+            <p:ph idx="1"/>
+          </p:nvPr>
+        </p:nvSpPr>
+        <p:spPr/>
+        <p:txBody>
+          <a:bodyPr/>
+          <a:lstStyle/>
+          <a:p>
+            <a:r>
+              <a:rPr lang="en-US" dirty="0"/>
+              <a:t>Hometown: Xi’an, China</a:t>
+            </a:r>
+          </a:p>
+          <a:p>
+            <a:r>
+              <a:rPr lang="en-US" dirty="0"/>
+              <a:t>Major: Computer Science</a:t>
+            </a:r>
+          </a:p>
+          <a:p>
+            <a:r>
+              <a:rPr lang="en-US" dirty="0"/>
+              <a:t>Interesting Fact: never give up</a:t>
+            </a:r>
+          </a:p>
+          <a:p>
+            <a:r>
+              <a:rPr lang="en-US" dirty="0"/>
+              <a:t>Role: Mario movement and design</a:t>
+            </a:r>
+          </a:p>
+          <a:p>
+            <a:endParaRPr lang="en-US" dirty="0"/>
+          </a:p>
+        </p:txBody>
+      </p:sp>
+    </p:spTree>
+    <p:extLst>
+      <p:ext uri="{BB962C8B-B14F-4D97-AF65-F5344CB8AC3E}">
+        <p14:creationId xmlns:p14="http://schemas.microsoft.com/office/powerpoint/2010/main" val="2655915451"/>
+      </p:ext>
+    </p:extLst>
+  </p:cSld>
+  <p:clrMapOvr>
+    <a:masterClrMapping/>
+  </p:clrMapOvr>
+</p:sld>
+</file>
+
+<file path=ppt/slides/slide7.xml><?xml version="1.0" encoding="utf-8"?>
+<p:sld xmlns:a="http://schemas.openxmlformats.org/drawingml/2006/main" xmlns:r="http://schemas.openxmlformats.org/officeDocument/2006/relationships" xmlns:p="http://schemas.openxmlformats.org/presentationml/2006/main">
+  <p:cSld>
+    <p:spTree>
+      <p:nvGrpSpPr>
+        <p:cNvPr id="1" name=""/>
+        <p:cNvGrpSpPr/>
+        <p:nvPr/>
+      </p:nvGrpSpPr>
+      <p:grpSpPr>
+        <a:xfrm>
+          <a:off x="0" y="0"/>
+          <a:ext cx="0" cy="0"/>
+          <a:chOff x="0" y="0"/>
+          <a:chExt cx="0" cy="0"/>
+        </a:xfrm>
+      </p:grpSpPr>
+      <p:sp>
+        <p:nvSpPr>
+          <p:cNvPr id="2" name="Title 1">
+            <a:extLst>
+              <a:ext uri="{FF2B5EF4-FFF2-40B4-BE49-F238E27FC236}">
                 <a16:creationId xmlns:a16="http://schemas.microsoft.com/office/drawing/2014/main" id="{1CC1429B-F771-3847-AC30-BB8535E31A9F}"/>
               </a:ext>
             </a:extLst>
@@ -6536,7 +6631,7 @@
 </p:sld>
 </file>
 
-<file path=ppt/slides/slide7.xml><?xml version="1.0" encoding="utf-8"?>
+<file path=ppt/slides/slide8.xml><?xml version="1.0" encoding="utf-8"?>
 <p:sld xmlns:a="http://schemas.openxmlformats.org/drawingml/2006/main" xmlns:r="http://schemas.openxmlformats.org/officeDocument/2006/relationships" xmlns:p="http://schemas.openxmlformats.org/presentationml/2006/main">
   <p:cSld>
     <p:spTree>

</xml_diff>